<commit_message>
presentation with inverted nontime pattern plots
</commit_message>
<xml_diff>
--- a/9 Documents/Presentation/AAA_presentation.pptx
+++ b/9 Documents/Presentation/AAA_presentation.pptx
@@ -15742,6 +15742,13 @@
   <p:clrMapOvr>
     <a:masterClrMapping/>
   </p:clrMapOvr>
+  <p:timing>
+    <p:tnLst>
+      <p:par>
+        <p:cTn id="1" dur="indefinite" restart="never" nodeType="tmRoot"/>
+      </p:par>
+    </p:tnLst>
+  </p:timing>
 </p:sld>
 </file>
 
@@ -16358,114 +16365,6 @@
       </p:sp>
       <p:pic>
         <p:nvPicPr>
-          <p:cNvPr id="1026" name="Picture 2" descr="snowQuantHist"/>
-          <p:cNvPicPr>
-            <a:picLocks noChangeAspect="1" noChangeArrowheads="1"/>
-          </p:cNvPicPr>
-          <p:nvPr/>
-        </p:nvPicPr>
-        <p:blipFill>
-          <a:blip r:embed="rId3">
-            <a:extLst>
-              <a:ext uri="{28A0092B-C50C-407E-A947-70E740481C1C}">
-                <a14:useLocalDpi xmlns:a14="http://schemas.microsoft.com/office/drawing/2010/main" val="0"/>
-              </a:ext>
-            </a:extLst>
-          </a:blip>
-          <a:srcRect/>
-          <a:stretch>
-            <a:fillRect/>
-          </a:stretch>
-        </p:blipFill>
-        <p:spPr bwMode="auto">
-          <a:xfrm>
-            <a:off x="5045483" y="4235449"/>
-            <a:ext cx="3231077" cy="2411220"/>
-          </a:xfrm>
-          <a:prstGeom prst="rect">
-            <a:avLst/>
-          </a:prstGeom>
-          <a:noFill/>
-          <a:ln>
-            <a:noFill/>
-          </a:ln>
-          <a:extLst>
-            <a:ext uri="{909E8E84-426E-40DD-AFC4-6F175D3DCCD1}">
-              <a14:hiddenFill xmlns:a14="http://schemas.microsoft.com/office/drawing/2010/main">
-                <a:solidFill>
-                  <a:srgbClr val="FFFFFF"/>
-                </a:solidFill>
-              </a14:hiddenFill>
-            </a:ext>
-            <a:ext uri="{91240B29-F687-4F45-9708-019B960494DF}">
-              <a14:hiddenLine xmlns:a14="http://schemas.microsoft.com/office/drawing/2010/main" w="9525">
-                <a:solidFill>
-                  <a:srgbClr val="000000"/>
-                </a:solidFill>
-                <a:miter lim="800000"/>
-                <a:headEnd/>
-                <a:tailEnd/>
-              </a14:hiddenLine>
-            </a:ext>
-          </a:extLst>
-        </p:spPr>
-      </p:pic>
-      <p:pic>
-        <p:nvPicPr>
-          <p:cNvPr id="1027" name="Picture 3" descr="violinsWeather"/>
-          <p:cNvPicPr>
-            <a:picLocks noChangeAspect="1" noChangeArrowheads="1"/>
-          </p:cNvPicPr>
-          <p:nvPr/>
-        </p:nvPicPr>
-        <p:blipFill>
-          <a:blip r:embed="rId4">
-            <a:extLst>
-              <a:ext uri="{28A0092B-C50C-407E-A947-70E740481C1C}">
-                <a14:useLocalDpi xmlns:a14="http://schemas.microsoft.com/office/drawing/2010/main" val="0"/>
-              </a:ext>
-            </a:extLst>
-          </a:blip>
-          <a:srcRect/>
-          <a:stretch>
-            <a:fillRect/>
-          </a:stretch>
-        </p:blipFill>
-        <p:spPr bwMode="auto">
-          <a:xfrm>
-            <a:off x="1136108" y="4235449"/>
-            <a:ext cx="2808312" cy="2329393"/>
-          </a:xfrm>
-          <a:prstGeom prst="rect">
-            <a:avLst/>
-          </a:prstGeom>
-          <a:noFill/>
-          <a:ln>
-            <a:noFill/>
-          </a:ln>
-          <a:extLst>
-            <a:ext uri="{909E8E84-426E-40DD-AFC4-6F175D3DCCD1}">
-              <a14:hiddenFill xmlns:a14="http://schemas.microsoft.com/office/drawing/2010/main">
-                <a:solidFill>
-                  <a:srgbClr val="FFFFFF"/>
-                </a:solidFill>
-              </a14:hiddenFill>
-            </a:ext>
-            <a:ext uri="{91240B29-F687-4F45-9708-019B960494DF}">
-              <a14:hiddenLine xmlns:a14="http://schemas.microsoft.com/office/drawing/2010/main" w="9525">
-                <a:solidFill>
-                  <a:srgbClr val="000000"/>
-                </a:solidFill>
-                <a:miter lim="800000"/>
-                <a:headEnd/>
-                <a:tailEnd/>
-              </a14:hiddenLine>
-            </a:ext>
-          </a:extLst>
-        </p:spPr>
-      </p:pic>
-      <p:pic>
-        <p:nvPicPr>
           <p:cNvPr id="6" name="Grafik 5">
             <a:extLst>
               <a:ext uri="{FF2B5EF4-FFF2-40B4-BE49-F238E27FC236}">
@@ -16479,7 +16378,7 @@
           <p:nvPr/>
         </p:nvPicPr>
         <p:blipFill>
-          <a:blip r:embed="rId5"/>
+          <a:blip r:embed="rId3"/>
           <a:stretch>
             <a:fillRect/>
           </a:stretch>
@@ -16509,7 +16408,7 @@
           <p:nvPr/>
         </p:nvPicPr>
         <p:blipFill>
-          <a:blip r:embed="rId6"/>
+          <a:blip r:embed="rId4"/>
           <a:stretch>
             <a:fillRect/>
           </a:stretch>
@@ -16518,6 +16417,66 @@
           <a:xfrm>
             <a:off x="1006504" y="1129188"/>
             <a:ext cx="3840578" cy="2880434"/>
+          </a:xfrm>
+          <a:prstGeom prst="rect">
+            <a:avLst/>
+          </a:prstGeom>
+        </p:spPr>
+      </p:pic>
+      <p:pic>
+        <p:nvPicPr>
+          <p:cNvPr id="2" name="Grafik 1"/>
+          <p:cNvPicPr>
+            <a:picLocks noChangeAspect="1"/>
+          </p:cNvPicPr>
+          <p:nvPr/>
+        </p:nvPicPr>
+        <p:blipFill>
+          <a:blip r:embed="rId5">
+            <a:extLst>
+              <a:ext uri="{28A0092B-C50C-407E-A947-70E740481C1C}">
+                <a14:useLocalDpi xmlns:a14="http://schemas.microsoft.com/office/drawing/2010/main" val="0"/>
+              </a:ext>
+            </a:extLst>
+          </a:blip>
+          <a:stretch>
+            <a:fillRect/>
+          </a:stretch>
+        </p:blipFill>
+        <p:spPr>
+          <a:xfrm>
+            <a:off x="1012250" y="4003796"/>
+            <a:ext cx="3331649" cy="2765268"/>
+          </a:xfrm>
+          <a:prstGeom prst="rect">
+            <a:avLst/>
+          </a:prstGeom>
+        </p:spPr>
+      </p:pic>
+      <p:pic>
+        <p:nvPicPr>
+          <p:cNvPr id="3" name="Grafik 2"/>
+          <p:cNvPicPr>
+            <a:picLocks noChangeAspect="1"/>
+          </p:cNvPicPr>
+          <p:nvPr/>
+        </p:nvPicPr>
+        <p:blipFill>
+          <a:blip r:embed="rId6">
+            <a:extLst>
+              <a:ext uri="{28A0092B-C50C-407E-A947-70E740481C1C}">
+                <a14:useLocalDpi xmlns:a14="http://schemas.microsoft.com/office/drawing/2010/main" val="0"/>
+              </a:ext>
+            </a:extLst>
+          </a:blip>
+          <a:stretch>
+            <a:fillRect/>
+          </a:stretch>
+        </p:blipFill>
+        <p:spPr>
+          <a:xfrm>
+            <a:off x="4673589" y="4003796"/>
+            <a:ext cx="3525719" cy="2633271"/>
           </a:xfrm>
           <a:prstGeom prst="rect">
             <a:avLst/>
@@ -16534,6 +16493,13 @@
   <p:clrMapOvr>
     <a:masterClrMapping/>
   </p:clrMapOvr>
+  <p:timing>
+    <p:tnLst>
+      <p:par>
+        <p:cTn id="1" dur="indefinite" restart="never" nodeType="tmRoot"/>
+      </p:par>
+    </p:tnLst>
+  </p:timing>
 </p:sld>
 </file>
 
@@ -17324,6 +17290,13 @@
   <p:clrMapOvr>
     <a:masterClrMapping/>
   </p:clrMapOvr>
+  <p:timing>
+    <p:tnLst>
+      <p:par>
+        <p:cTn id="1" dur="indefinite" restart="never" nodeType="tmRoot"/>
+      </p:par>
+    </p:tnLst>
+  </p:timing>
 </p:sld>
 </file>
 

</xml_diff>

<commit_message>
added expected profit to presentation as backup slide
</commit_message>
<xml_diff>
--- a/9 Documents/Presentation/AAA_presentation.pptx
+++ b/9 Documents/Presentation/AAA_presentation.pptx
@@ -5,7 +5,7 @@
     <p:sldMasterId id="2147483658" r:id="rId1"/>
   </p:sldMasterIdLst>
   <p:notesMasterIdLst>
-    <p:notesMasterId r:id="rId15"/>
+    <p:notesMasterId r:id="rId16"/>
   </p:notesMasterIdLst>
   <p:sldIdLst>
     <p:sldId id="284" r:id="rId2"/>
@@ -21,6 +21,7 @@
     <p:sldId id="279" r:id="rId12"/>
     <p:sldId id="287" r:id="rId13"/>
     <p:sldId id="297" r:id="rId14"/>
+    <p:sldId id="298" r:id="rId15"/>
   </p:sldIdLst>
   <p:sldSz cx="9144000" cy="6858000" type="screen4x3"/>
   <p:notesSz cx="6858000" cy="9144000"/>
@@ -1428,6 +1429,115 @@
     <p:extLst>
       <p:ext uri="{BB962C8B-B14F-4D97-AF65-F5344CB8AC3E}">
         <p14:creationId xmlns:p14="http://schemas.microsoft.com/office/powerpoint/2010/main" val="2080090348"/>
+      </p:ext>
+    </p:extLst>
+  </p:cSld>
+  <p:clrMapOvr>
+    <a:masterClrMapping/>
+  </p:clrMapOvr>
+</p:notes>
+</file>
+
+<file path=ppt/notesSlides/notesSlide14.xml><?xml version="1.0" encoding="utf-8"?>
+<p:notes xmlns:a="http://schemas.openxmlformats.org/drawingml/2006/main" xmlns:r="http://schemas.openxmlformats.org/officeDocument/2006/relationships" xmlns:p="http://schemas.openxmlformats.org/presentationml/2006/main" showMasterSp="0" showMasterPhAnim="0">
+  <p:cSld>
+    <p:spTree>
+      <p:nvGrpSpPr>
+        <p:cNvPr id="1" name="Shape 202"/>
+        <p:cNvGrpSpPr/>
+        <p:nvPr/>
+      </p:nvGrpSpPr>
+      <p:grpSpPr>
+        <a:xfrm>
+          <a:off x="0" y="0"/>
+          <a:ext cx="0" cy="0"/>
+          <a:chOff x="0" y="0"/>
+          <a:chExt cx="0" cy="0"/>
+        </a:xfrm>
+      </p:grpSpPr>
+      <p:sp>
+        <p:nvSpPr>
+          <p:cNvPr id="203" name="Google Shape;203;g35ed75ccf_028:notes"/>
+          <p:cNvSpPr>
+            <a:spLocks noGrp="1" noRot="1" noChangeAspect="1"/>
+          </p:cNvSpPr>
+          <p:nvPr>
+            <p:ph type="sldImg" idx="2"/>
+          </p:nvPr>
+        </p:nvSpPr>
+        <p:spPr>
+          <a:xfrm>
+            <a:off x="1143000" y="685800"/>
+            <a:ext cx="4572000" cy="3429000"/>
+          </a:xfrm>
+          <a:custGeom>
+            <a:avLst/>
+            <a:gdLst/>
+            <a:ahLst/>
+            <a:cxnLst/>
+            <a:rect l="l" t="t" r="r" b="b"/>
+            <a:pathLst>
+              <a:path w="120000" h="120000" extrusionOk="0">
+                <a:moveTo>
+                  <a:pt x="0" y="0"/>
+                </a:moveTo>
+                <a:lnTo>
+                  <a:pt x="120000" y="0"/>
+                </a:lnTo>
+                <a:lnTo>
+                  <a:pt x="120000" y="120000"/>
+                </a:lnTo>
+                <a:lnTo>
+                  <a:pt x="0" y="120000"/>
+                </a:lnTo>
+                <a:close/>
+              </a:path>
+            </a:pathLst>
+          </a:custGeom>
+        </p:spPr>
+      </p:sp>
+      <p:sp>
+        <p:nvSpPr>
+          <p:cNvPr id="204" name="Google Shape;204;g35ed75ccf_028:notes"/>
+          <p:cNvSpPr txBox="1">
+            <a:spLocks noGrp="1"/>
+          </p:cNvSpPr>
+          <p:nvPr>
+            <p:ph type="body" idx="1"/>
+          </p:nvPr>
+        </p:nvSpPr>
+        <p:spPr>
+          <a:xfrm>
+            <a:off x="685800" y="4343400"/>
+            <a:ext cx="5486400" cy="4114800"/>
+          </a:xfrm>
+          <a:prstGeom prst="rect">
+            <a:avLst/>
+          </a:prstGeom>
+        </p:spPr>
+        <p:txBody>
+          <a:bodyPr spcFirstLastPara="1" wrap="square" lIns="91425" tIns="91425" rIns="91425" bIns="91425" anchor="t" anchorCtr="0">
+            <a:noAutofit/>
+          </a:bodyPr>
+          <a:lstStyle/>
+          <a:p>
+            <a:pPr marL="0" lvl="0" indent="0" algn="l" rtl="0">
+              <a:spcBef>
+                <a:spcPts val="0"/>
+              </a:spcBef>
+              <a:spcAft>
+                <a:spcPts val="0"/>
+              </a:spcAft>
+              <a:buNone/>
+            </a:pPr>
+            <a:endParaRPr dirty="0"/>
+          </a:p>
+        </p:txBody>
+      </p:sp>
+    </p:spTree>
+    <p:extLst>
+      <p:ext uri="{BB962C8B-B14F-4D97-AF65-F5344CB8AC3E}">
+        <p14:creationId xmlns:p14="http://schemas.microsoft.com/office/powerpoint/2010/main" val="3803652759"/>
       </p:ext>
     </p:extLst>
   </p:cSld>
@@ -6869,6 +6979,1469 @@
   <p:transition>
     <p:fade thruBlk="1"/>
   </p:transition>
+</p:sld>
+</file>
+
+<file path=ppt/slides/slide14.xml><?xml version="1.0" encoding="utf-8"?>
+<p:sld xmlns:a="http://schemas.openxmlformats.org/drawingml/2006/main" xmlns:r="http://schemas.openxmlformats.org/officeDocument/2006/relationships" xmlns:p="http://schemas.openxmlformats.org/presentationml/2006/main">
+  <p:cSld>
+    <p:spTree>
+      <p:nvGrpSpPr>
+        <p:cNvPr id="1" name="Shape 205"/>
+        <p:cNvGrpSpPr/>
+        <p:nvPr/>
+      </p:nvGrpSpPr>
+      <p:grpSpPr>
+        <a:xfrm>
+          <a:off x="0" y="0"/>
+          <a:ext cx="0" cy="0"/>
+          <a:chOff x="0" y="0"/>
+          <a:chExt cx="0" cy="0"/>
+        </a:xfrm>
+      </p:grpSpPr>
+      <p:sp>
+        <p:nvSpPr>
+          <p:cNvPr id="208" name="Google Shape;208;p26"/>
+          <p:cNvSpPr txBox="1">
+            <a:spLocks noGrp="1"/>
+          </p:cNvSpPr>
+          <p:nvPr>
+            <p:ph type="sldNum" idx="12"/>
+          </p:nvPr>
+        </p:nvSpPr>
+        <p:spPr>
+          <a:xfrm>
+            <a:off x="8523157" y="6465084"/>
+            <a:ext cx="548700" cy="420300"/>
+          </a:xfrm>
+          <a:prstGeom prst="rect">
+            <a:avLst/>
+          </a:prstGeom>
+        </p:spPr>
+        <p:txBody>
+          <a:bodyPr spcFirstLastPara="1" wrap="square" lIns="91425" tIns="91425" rIns="91425" bIns="91425" anchor="t" anchorCtr="0">
+            <a:noAutofit/>
+          </a:bodyPr>
+          <a:lstStyle/>
+          <a:p>
+            <a:pPr marL="0" lvl="0" indent="0" algn="r" rtl="0">
+              <a:spcBef>
+                <a:spcPts val="0"/>
+              </a:spcBef>
+              <a:spcAft>
+                <a:spcPts val="0"/>
+              </a:spcAft>
+              <a:buNone/>
+            </a:pPr>
+            <a:fld id="{00000000-1234-1234-1234-123412341234}" type="slidenum">
+              <a:rPr lang="en"/>
+              <a:t>14</a:t>
+            </a:fld>
+            <a:endParaRPr/>
+          </a:p>
+        </p:txBody>
+      </p:sp>
+      <p:sp>
+        <p:nvSpPr>
+          <p:cNvPr id="15" name="Google Shape;76;p13">
+            <a:extLst>
+              <a:ext uri="{FF2B5EF4-FFF2-40B4-BE49-F238E27FC236}">
+                <a16:creationId xmlns:a16="http://schemas.microsoft.com/office/drawing/2014/main" id="{7BCB230A-5414-8048-B0B6-B29E4C5E8F19}"/>
+              </a:ext>
+            </a:extLst>
+          </p:cNvPr>
+          <p:cNvSpPr txBox="1">
+            <a:spLocks/>
+          </p:cNvSpPr>
+          <p:nvPr/>
+        </p:nvSpPr>
+        <p:spPr>
+          <a:xfrm>
+            <a:off x="1143000" y="200490"/>
+            <a:ext cx="6858000" cy="852246"/>
+          </a:xfrm>
+          <a:prstGeom prst="rect">
+            <a:avLst/>
+          </a:prstGeom>
+          <a:noFill/>
+          <a:ln>
+            <a:noFill/>
+          </a:ln>
+        </p:spPr>
+        <p:txBody>
+          <a:bodyPr spcFirstLastPara="1" wrap="square" lIns="91425" tIns="91425" rIns="91425" bIns="91425" anchor="b" anchorCtr="0">
+            <a:noAutofit/>
+          </a:bodyPr>
+          <a:lstStyle>
+            <a:defPPr marR="0" lvl="0" algn="l" rtl="0">
+              <a:lnSpc>
+                <a:spcPct val="100000"/>
+              </a:lnSpc>
+              <a:spcBef>
+                <a:spcPts val="0"/>
+              </a:spcBef>
+              <a:spcAft>
+                <a:spcPts val="0"/>
+              </a:spcAft>
+            </a:defPPr>
+            <a:lvl1pPr marR="0" lvl="0" algn="l" rtl="0">
+              <a:lnSpc>
+                <a:spcPct val="100000"/>
+              </a:lnSpc>
+              <a:spcBef>
+                <a:spcPts val="0"/>
+              </a:spcBef>
+              <a:spcAft>
+                <a:spcPts val="0"/>
+              </a:spcAft>
+              <a:buClr>
+                <a:srgbClr val="39C0BA"/>
+              </a:buClr>
+              <a:buSzPts val="1800"/>
+              <a:buFont typeface="Quicksand"/>
+              <a:buNone/>
+              <a:defRPr sz="1800" b="0" i="0" u="none" strike="noStrike" cap="none">
+                <a:solidFill>
+                  <a:srgbClr val="39C0BA"/>
+                </a:solidFill>
+                <a:latin typeface="Quicksand"/>
+                <a:ea typeface="Quicksand"/>
+                <a:cs typeface="Quicksand"/>
+                <a:sym typeface="Quicksand"/>
+              </a:defRPr>
+            </a:lvl1pPr>
+            <a:lvl2pPr marR="0" lvl="1" algn="l" rtl="0">
+              <a:lnSpc>
+                <a:spcPct val="100000"/>
+              </a:lnSpc>
+              <a:spcBef>
+                <a:spcPts val="0"/>
+              </a:spcBef>
+              <a:spcAft>
+                <a:spcPts val="0"/>
+              </a:spcAft>
+              <a:buClr>
+                <a:srgbClr val="39C0BA"/>
+              </a:buClr>
+              <a:buSzPts val="1800"/>
+              <a:buFont typeface="Quicksand"/>
+              <a:buNone/>
+              <a:defRPr sz="1800" b="0" i="0" u="none" strike="noStrike" cap="none">
+                <a:solidFill>
+                  <a:srgbClr val="39C0BA"/>
+                </a:solidFill>
+                <a:latin typeface="Quicksand"/>
+                <a:ea typeface="Quicksand"/>
+                <a:cs typeface="Quicksand"/>
+                <a:sym typeface="Quicksand"/>
+              </a:defRPr>
+            </a:lvl2pPr>
+            <a:lvl3pPr marR="0" lvl="2" algn="l" rtl="0">
+              <a:lnSpc>
+                <a:spcPct val="100000"/>
+              </a:lnSpc>
+              <a:spcBef>
+                <a:spcPts val="0"/>
+              </a:spcBef>
+              <a:spcAft>
+                <a:spcPts val="0"/>
+              </a:spcAft>
+              <a:buClr>
+                <a:srgbClr val="39C0BA"/>
+              </a:buClr>
+              <a:buSzPts val="1800"/>
+              <a:buFont typeface="Quicksand"/>
+              <a:buNone/>
+              <a:defRPr sz="1800" b="0" i="0" u="none" strike="noStrike" cap="none">
+                <a:solidFill>
+                  <a:srgbClr val="39C0BA"/>
+                </a:solidFill>
+                <a:latin typeface="Quicksand"/>
+                <a:ea typeface="Quicksand"/>
+                <a:cs typeface="Quicksand"/>
+                <a:sym typeface="Quicksand"/>
+              </a:defRPr>
+            </a:lvl3pPr>
+            <a:lvl4pPr marR="0" lvl="3" algn="l" rtl="0">
+              <a:lnSpc>
+                <a:spcPct val="100000"/>
+              </a:lnSpc>
+              <a:spcBef>
+                <a:spcPts val="0"/>
+              </a:spcBef>
+              <a:spcAft>
+                <a:spcPts val="0"/>
+              </a:spcAft>
+              <a:buClr>
+                <a:srgbClr val="39C0BA"/>
+              </a:buClr>
+              <a:buSzPts val="1800"/>
+              <a:buFont typeface="Quicksand"/>
+              <a:buNone/>
+              <a:defRPr sz="1800" b="0" i="0" u="none" strike="noStrike" cap="none">
+                <a:solidFill>
+                  <a:srgbClr val="39C0BA"/>
+                </a:solidFill>
+                <a:latin typeface="Quicksand"/>
+                <a:ea typeface="Quicksand"/>
+                <a:cs typeface="Quicksand"/>
+                <a:sym typeface="Quicksand"/>
+              </a:defRPr>
+            </a:lvl4pPr>
+            <a:lvl5pPr marR="0" lvl="4" algn="l" rtl="0">
+              <a:lnSpc>
+                <a:spcPct val="100000"/>
+              </a:lnSpc>
+              <a:spcBef>
+                <a:spcPts val="0"/>
+              </a:spcBef>
+              <a:spcAft>
+                <a:spcPts val="0"/>
+              </a:spcAft>
+              <a:buClr>
+                <a:srgbClr val="39C0BA"/>
+              </a:buClr>
+              <a:buSzPts val="1800"/>
+              <a:buFont typeface="Quicksand"/>
+              <a:buNone/>
+              <a:defRPr sz="1800" b="0" i="0" u="none" strike="noStrike" cap="none">
+                <a:solidFill>
+                  <a:srgbClr val="39C0BA"/>
+                </a:solidFill>
+                <a:latin typeface="Quicksand"/>
+                <a:ea typeface="Quicksand"/>
+                <a:cs typeface="Quicksand"/>
+                <a:sym typeface="Quicksand"/>
+              </a:defRPr>
+            </a:lvl5pPr>
+            <a:lvl6pPr marR="0" lvl="5" algn="l" rtl="0">
+              <a:lnSpc>
+                <a:spcPct val="100000"/>
+              </a:lnSpc>
+              <a:spcBef>
+                <a:spcPts val="0"/>
+              </a:spcBef>
+              <a:spcAft>
+                <a:spcPts val="0"/>
+              </a:spcAft>
+              <a:buClr>
+                <a:srgbClr val="39C0BA"/>
+              </a:buClr>
+              <a:buSzPts val="1800"/>
+              <a:buFont typeface="Quicksand"/>
+              <a:buNone/>
+              <a:defRPr sz="1800" b="0" i="0" u="none" strike="noStrike" cap="none">
+                <a:solidFill>
+                  <a:srgbClr val="39C0BA"/>
+                </a:solidFill>
+                <a:latin typeface="Quicksand"/>
+                <a:ea typeface="Quicksand"/>
+                <a:cs typeface="Quicksand"/>
+                <a:sym typeface="Quicksand"/>
+              </a:defRPr>
+            </a:lvl6pPr>
+            <a:lvl7pPr marR="0" lvl="6" algn="l" rtl="0">
+              <a:lnSpc>
+                <a:spcPct val="100000"/>
+              </a:lnSpc>
+              <a:spcBef>
+                <a:spcPts val="0"/>
+              </a:spcBef>
+              <a:spcAft>
+                <a:spcPts val="0"/>
+              </a:spcAft>
+              <a:buClr>
+                <a:srgbClr val="39C0BA"/>
+              </a:buClr>
+              <a:buSzPts val="1800"/>
+              <a:buFont typeface="Quicksand"/>
+              <a:buNone/>
+              <a:defRPr sz="1800" b="0" i="0" u="none" strike="noStrike" cap="none">
+                <a:solidFill>
+                  <a:srgbClr val="39C0BA"/>
+                </a:solidFill>
+                <a:latin typeface="Quicksand"/>
+                <a:ea typeface="Quicksand"/>
+                <a:cs typeface="Quicksand"/>
+                <a:sym typeface="Quicksand"/>
+              </a:defRPr>
+            </a:lvl7pPr>
+            <a:lvl8pPr marR="0" lvl="7" algn="l" rtl="0">
+              <a:lnSpc>
+                <a:spcPct val="100000"/>
+              </a:lnSpc>
+              <a:spcBef>
+                <a:spcPts val="0"/>
+              </a:spcBef>
+              <a:spcAft>
+                <a:spcPts val="0"/>
+              </a:spcAft>
+              <a:buClr>
+                <a:srgbClr val="39C0BA"/>
+              </a:buClr>
+              <a:buSzPts val="1800"/>
+              <a:buFont typeface="Quicksand"/>
+              <a:buNone/>
+              <a:defRPr sz="1800" b="0" i="0" u="none" strike="noStrike" cap="none">
+                <a:solidFill>
+                  <a:srgbClr val="39C0BA"/>
+                </a:solidFill>
+                <a:latin typeface="Quicksand"/>
+                <a:ea typeface="Quicksand"/>
+                <a:cs typeface="Quicksand"/>
+                <a:sym typeface="Quicksand"/>
+              </a:defRPr>
+            </a:lvl8pPr>
+            <a:lvl9pPr marR="0" lvl="8" algn="l" rtl="0">
+              <a:lnSpc>
+                <a:spcPct val="100000"/>
+              </a:lnSpc>
+              <a:spcBef>
+                <a:spcPts val="0"/>
+              </a:spcBef>
+              <a:spcAft>
+                <a:spcPts val="0"/>
+              </a:spcAft>
+              <a:buClr>
+                <a:srgbClr val="39C0BA"/>
+              </a:buClr>
+              <a:buSzPts val="1800"/>
+              <a:buFont typeface="Quicksand"/>
+              <a:buNone/>
+              <a:defRPr sz="1800" b="0" i="0" u="none" strike="noStrike" cap="none">
+                <a:solidFill>
+                  <a:srgbClr val="39C0BA"/>
+                </a:solidFill>
+                <a:latin typeface="Quicksand"/>
+                <a:ea typeface="Quicksand"/>
+                <a:cs typeface="Quicksand"/>
+                <a:sym typeface="Quicksand"/>
+              </a:defRPr>
+            </a:lvl9pPr>
+          </a:lstStyle>
+          <a:p>
+            <a:r>
+              <a:rPr lang="en" sz="2400" dirty="0"/>
+              <a:t>Evaluation: </a:t>
+            </a:r>
+          </a:p>
+          <a:p>
+            <a:r>
+              <a:rPr lang="de-DE" sz="2400" dirty="0" err="1" smtClean="0"/>
+              <a:t>Expected</a:t>
+            </a:r>
+            <a:r>
+              <a:rPr lang="de-DE" sz="2400" dirty="0" smtClean="0"/>
+              <a:t> </a:t>
+            </a:r>
+            <a:r>
+              <a:rPr lang="de-DE" sz="2400" dirty="0" err="1" smtClean="0"/>
+              <a:t>profit</a:t>
+            </a:r>
+            <a:endParaRPr lang="de-DE" sz="2400" dirty="0"/>
+          </a:p>
+        </p:txBody>
+      </p:sp>
+      <p:sp>
+        <p:nvSpPr>
+          <p:cNvPr id="18" name="Textfeld 17">
+            <a:extLst>
+              <a:ext uri="{FF2B5EF4-FFF2-40B4-BE49-F238E27FC236}">
+                <a16:creationId xmlns:a16="http://schemas.microsoft.com/office/drawing/2014/main" id="{27C1466C-DB19-5840-8343-641CE5F0441E}"/>
+              </a:ext>
+            </a:extLst>
+          </p:cNvPr>
+          <p:cNvSpPr txBox="1"/>
+          <p:nvPr/>
+        </p:nvSpPr>
+        <p:spPr>
+          <a:xfrm>
+            <a:off x="1571328" y="3483000"/>
+            <a:ext cx="6192688" cy="400110"/>
+          </a:xfrm>
+          <a:prstGeom prst="rect">
+            <a:avLst/>
+          </a:prstGeom>
+          <a:noFill/>
+        </p:spPr>
+        <p:txBody>
+          <a:bodyPr wrap="square" rtlCol="0">
+            <a:spAutoFit/>
+          </a:bodyPr>
+          <a:lstStyle/>
+          <a:p>
+            <a:r>
+              <a:rPr lang="de-DE" sz="2000" dirty="0" err="1" smtClean="0">
+                <a:solidFill>
+                  <a:schemeClr val="bg1"/>
+                </a:solidFill>
+                <a:latin typeface="Quicksand" pitchFamily="2" charset="77"/>
+              </a:rPr>
+              <a:t>Expected</a:t>
+            </a:r>
+            <a:r>
+              <a:rPr lang="de-DE" sz="2000" dirty="0" smtClean="0">
+                <a:solidFill>
+                  <a:schemeClr val="bg1"/>
+                </a:solidFill>
+                <a:latin typeface="Quicksand" pitchFamily="2" charset="77"/>
+              </a:rPr>
+              <a:t> </a:t>
+            </a:r>
+            <a:r>
+              <a:rPr lang="de-DE" sz="2000" dirty="0" err="1" smtClean="0">
+                <a:solidFill>
+                  <a:schemeClr val="bg1"/>
+                </a:solidFill>
+                <a:latin typeface="Quicksand" pitchFamily="2" charset="77"/>
+              </a:rPr>
+              <a:t>profit</a:t>
+            </a:r>
+            <a:r>
+              <a:rPr lang="de-DE" sz="2000" dirty="0" smtClean="0">
+                <a:solidFill>
+                  <a:schemeClr val="bg1"/>
+                </a:solidFill>
+                <a:latin typeface="Quicksand" pitchFamily="2" charset="77"/>
+              </a:rPr>
+              <a:t> per </a:t>
+            </a:r>
+            <a:r>
+              <a:rPr lang="de-DE" sz="2000" dirty="0" err="1">
+                <a:solidFill>
+                  <a:schemeClr val="bg1"/>
+                </a:solidFill>
+                <a:latin typeface="Quicksand" pitchFamily="2" charset="77"/>
+              </a:rPr>
+              <a:t>M</a:t>
+            </a:r>
+            <a:r>
+              <a:rPr lang="de-DE" sz="2000" dirty="0" err="1" smtClean="0">
+                <a:solidFill>
+                  <a:schemeClr val="bg1"/>
+                </a:solidFill>
+                <a:latin typeface="Quicksand" pitchFamily="2" charset="77"/>
+              </a:rPr>
+              <a:t>wh</a:t>
+            </a:r>
+            <a:r>
+              <a:rPr lang="de-DE" sz="2000" dirty="0" smtClean="0">
+                <a:solidFill>
+                  <a:schemeClr val="bg1"/>
+                </a:solidFill>
+                <a:latin typeface="Quicksand" pitchFamily="2" charset="77"/>
+              </a:rPr>
+              <a:t>: 0.24 € (TC 78% </a:t>
+            </a:r>
+            <a:r>
+              <a:rPr lang="de-DE" sz="2000" dirty="0" err="1" smtClean="0">
+                <a:solidFill>
+                  <a:schemeClr val="bg1"/>
+                </a:solidFill>
+                <a:latin typeface="Quicksand" pitchFamily="2" charset="77"/>
+              </a:rPr>
+              <a:t>accuracy</a:t>
+            </a:r>
+            <a:r>
+              <a:rPr lang="de-DE" sz="2000" dirty="0" smtClean="0">
+                <a:solidFill>
+                  <a:schemeClr val="bg1"/>
+                </a:solidFill>
+                <a:latin typeface="Quicksand" pitchFamily="2" charset="77"/>
+              </a:rPr>
+              <a:t>)</a:t>
+            </a:r>
+            <a:endParaRPr lang="de-DE" sz="2000" dirty="0">
+              <a:solidFill>
+                <a:schemeClr val="bg1"/>
+              </a:solidFill>
+              <a:latin typeface="Quicksand" pitchFamily="2" charset="77"/>
+            </a:endParaRPr>
+          </a:p>
+        </p:txBody>
+      </p:sp>
+      <p:graphicFrame>
+        <p:nvGraphicFramePr>
+          <p:cNvPr id="19" name="Tabelle 18"/>
+          <p:cNvGraphicFramePr>
+            <a:graphicFrameLocks noGrp="1"/>
+          </p:cNvGraphicFramePr>
+          <p:nvPr>
+            <p:extLst>
+              <p:ext uri="{D42A27DB-BD31-4B8C-83A1-F6EECF244321}">
+                <p14:modId xmlns:p14="http://schemas.microsoft.com/office/powerpoint/2010/main" val="3979866666"/>
+              </p:ext>
+            </p:extLst>
+          </p:nvPr>
+        </p:nvGraphicFramePr>
+        <p:xfrm>
+          <a:off x="1619672" y="1340768"/>
+          <a:ext cx="6096000" cy="1854200"/>
+        </p:xfrm>
+        <a:graphic>
+          <a:graphicData uri="http://schemas.openxmlformats.org/drawingml/2006/table">
+            <a:tbl>
+              <a:tblPr firstRow="1" bandRow="1">
+                <a:tableStyleId>{3CB7986B-AABD-43F1-97A2-5042424439FD}</a:tableStyleId>
+              </a:tblPr>
+              <a:tblGrid>
+                <a:gridCol w="2032000">
+                  <a:extLst>
+                    <a:ext uri="{9D8B030D-6E8A-4147-A177-3AD203B41FA5}">
+                      <a16:colId xmlns:a16="http://schemas.microsoft.com/office/drawing/2014/main" val="2741971338"/>
+                    </a:ext>
+                  </a:extLst>
+                </a:gridCol>
+                <a:gridCol w="2032000">
+                  <a:extLst>
+                    <a:ext uri="{9D8B030D-6E8A-4147-A177-3AD203B41FA5}">
+                      <a16:colId xmlns:a16="http://schemas.microsoft.com/office/drawing/2014/main" val="2569096445"/>
+                    </a:ext>
+                  </a:extLst>
+                </a:gridCol>
+                <a:gridCol w="2032000">
+                  <a:extLst>
+                    <a:ext uri="{9D8B030D-6E8A-4147-A177-3AD203B41FA5}">
+                      <a16:colId xmlns:a16="http://schemas.microsoft.com/office/drawing/2014/main" val="1921302279"/>
+                    </a:ext>
+                  </a:extLst>
+                </a:gridCol>
+              </a:tblGrid>
+              <a:tr h="370840">
+                <a:tc>
+                  <a:txBody>
+                    <a:bodyPr/>
+                    <a:lstStyle/>
+                    <a:p>
+                      <a:r>
+                        <a:rPr lang="de-DE" dirty="0" err="1" smtClean="0">
+                          <a:solidFill>
+                            <a:schemeClr val="bg1"/>
+                          </a:solidFill>
+                        </a:rPr>
+                        <a:t>Prediction</a:t>
+                      </a:r>
+                      <a:endParaRPr lang="de-DE" dirty="0">
+                        <a:solidFill>
+                          <a:schemeClr val="bg1"/>
+                        </a:solidFill>
+                      </a:endParaRPr>
+                    </a:p>
+                  </a:txBody>
+                  <a:tcPr>
+                    <a:lnL w="28575" cap="flat" cmpd="sng" algn="ctr">
+                      <a:solidFill>
+                        <a:schemeClr val="bg1"/>
+                      </a:solidFill>
+                      <a:prstDash val="solid"/>
+                      <a:round/>
+                      <a:headEnd type="none" w="med" len="med"/>
+                      <a:tailEnd type="none" w="med" len="med"/>
+                    </a:lnL>
+                    <a:lnR w="28575" cap="flat" cmpd="sng" algn="ctr">
+                      <a:solidFill>
+                        <a:schemeClr val="bg1"/>
+                      </a:solidFill>
+                      <a:prstDash val="solid"/>
+                      <a:round/>
+                      <a:headEnd type="none" w="med" len="med"/>
+                      <a:tailEnd type="none" w="med" len="med"/>
+                    </a:lnR>
+                    <a:lnT w="28575" cap="flat" cmpd="sng" algn="ctr">
+                      <a:solidFill>
+                        <a:schemeClr val="bg1"/>
+                      </a:solidFill>
+                      <a:prstDash val="solid"/>
+                      <a:round/>
+                      <a:headEnd type="none" w="med" len="med"/>
+                      <a:tailEnd type="none" w="med" len="med"/>
+                    </a:lnT>
+                    <a:lnB w="28575" cap="flat" cmpd="sng" algn="ctr">
+                      <a:solidFill>
+                        <a:schemeClr val="bg1"/>
+                      </a:solidFill>
+                      <a:prstDash val="solid"/>
+                      <a:round/>
+                      <a:headEnd type="none" w="med" len="med"/>
+                      <a:tailEnd type="none" w="med" len="med"/>
+                    </a:lnB>
+                  </a:tcPr>
+                </a:tc>
+                <a:tc>
+                  <a:txBody>
+                    <a:bodyPr/>
+                    <a:lstStyle/>
+                    <a:p>
+                      <a:r>
+                        <a:rPr lang="de-DE" dirty="0" err="1" smtClean="0">
+                          <a:solidFill>
+                            <a:schemeClr val="bg1"/>
+                          </a:solidFill>
+                        </a:rPr>
+                        <a:t>Actual</a:t>
+                      </a:r>
+                      <a:endParaRPr lang="de-DE" dirty="0">
+                        <a:solidFill>
+                          <a:schemeClr val="bg1"/>
+                        </a:solidFill>
+                      </a:endParaRPr>
+                    </a:p>
+                  </a:txBody>
+                  <a:tcPr>
+                    <a:lnL w="28575" cap="flat" cmpd="sng" algn="ctr">
+                      <a:solidFill>
+                        <a:schemeClr val="bg1"/>
+                      </a:solidFill>
+                      <a:prstDash val="solid"/>
+                      <a:round/>
+                      <a:headEnd type="none" w="med" len="med"/>
+                      <a:tailEnd type="none" w="med" len="med"/>
+                    </a:lnL>
+                    <a:lnR w="28575" cap="flat" cmpd="sng" algn="ctr">
+                      <a:solidFill>
+                        <a:schemeClr val="bg1"/>
+                      </a:solidFill>
+                      <a:prstDash val="solid"/>
+                      <a:round/>
+                      <a:headEnd type="none" w="med" len="med"/>
+                      <a:tailEnd type="none" w="med" len="med"/>
+                    </a:lnR>
+                    <a:lnT w="28575" cap="flat" cmpd="sng" algn="ctr">
+                      <a:solidFill>
+                        <a:schemeClr val="bg1"/>
+                      </a:solidFill>
+                      <a:prstDash val="solid"/>
+                      <a:round/>
+                      <a:headEnd type="none" w="med" len="med"/>
+                      <a:tailEnd type="none" w="med" len="med"/>
+                    </a:lnT>
+                    <a:lnB w="28575" cap="flat" cmpd="sng" algn="ctr">
+                      <a:solidFill>
+                        <a:schemeClr val="bg1"/>
+                      </a:solidFill>
+                      <a:prstDash val="solid"/>
+                      <a:round/>
+                      <a:headEnd type="none" w="med" len="med"/>
+                      <a:tailEnd type="none" w="med" len="med"/>
+                    </a:lnB>
+                  </a:tcPr>
+                </a:tc>
+                <a:tc>
+                  <a:txBody>
+                    <a:bodyPr/>
+                    <a:lstStyle/>
+                    <a:p>
+                      <a:r>
+                        <a:rPr lang="de-DE" dirty="0" smtClean="0">
+                          <a:solidFill>
+                            <a:schemeClr val="bg1"/>
+                          </a:solidFill>
+                        </a:rPr>
+                        <a:t>Cash</a:t>
+                      </a:r>
+                      <a:r>
+                        <a:rPr lang="de-DE" baseline="0" dirty="0" smtClean="0">
+                          <a:solidFill>
+                            <a:schemeClr val="bg1"/>
+                          </a:solidFill>
+                        </a:rPr>
+                        <a:t> </a:t>
+                      </a:r>
+                      <a:r>
+                        <a:rPr lang="de-DE" baseline="0" dirty="0" err="1" smtClean="0">
+                          <a:solidFill>
+                            <a:schemeClr val="bg1"/>
+                          </a:solidFill>
+                        </a:rPr>
+                        <a:t>change</a:t>
+                      </a:r>
+                      <a:endParaRPr lang="de-DE" dirty="0">
+                        <a:solidFill>
+                          <a:schemeClr val="bg1"/>
+                        </a:solidFill>
+                      </a:endParaRPr>
+                    </a:p>
+                  </a:txBody>
+                  <a:tcPr>
+                    <a:lnL w="28575" cap="flat" cmpd="sng" algn="ctr">
+                      <a:solidFill>
+                        <a:schemeClr val="bg1"/>
+                      </a:solidFill>
+                      <a:prstDash val="solid"/>
+                      <a:round/>
+                      <a:headEnd type="none" w="med" len="med"/>
+                      <a:tailEnd type="none" w="med" len="med"/>
+                    </a:lnL>
+                    <a:lnR w="28575" cap="flat" cmpd="sng" algn="ctr">
+                      <a:solidFill>
+                        <a:schemeClr val="bg1"/>
+                      </a:solidFill>
+                      <a:prstDash val="solid"/>
+                      <a:round/>
+                      <a:headEnd type="none" w="med" len="med"/>
+                      <a:tailEnd type="none" w="med" len="med"/>
+                    </a:lnR>
+                    <a:lnT w="28575" cap="flat" cmpd="sng" algn="ctr">
+                      <a:solidFill>
+                        <a:schemeClr val="bg1"/>
+                      </a:solidFill>
+                      <a:prstDash val="solid"/>
+                      <a:round/>
+                      <a:headEnd type="none" w="med" len="med"/>
+                      <a:tailEnd type="none" w="med" len="med"/>
+                    </a:lnT>
+                    <a:lnB w="28575" cap="flat" cmpd="sng" algn="ctr">
+                      <a:solidFill>
+                        <a:schemeClr val="bg1"/>
+                      </a:solidFill>
+                      <a:prstDash val="solid"/>
+                      <a:round/>
+                      <a:headEnd type="none" w="med" len="med"/>
+                      <a:tailEnd type="none" w="med" len="med"/>
+                    </a:lnB>
+                  </a:tcPr>
+                </a:tc>
+                <a:extLst>
+                  <a:ext uri="{0D108BD9-81ED-4DB2-BD59-A6C34878D82A}">
+                    <a16:rowId xmlns:a16="http://schemas.microsoft.com/office/drawing/2014/main" val="1289302540"/>
+                  </a:ext>
+                </a:extLst>
+              </a:tr>
+              <a:tr h="370840">
+                <a:tc>
+                  <a:txBody>
+                    <a:bodyPr/>
+                    <a:lstStyle/>
+                    <a:p>
+                      <a:r>
+                        <a:rPr lang="de-DE" dirty="0" smtClean="0">
+                          <a:solidFill>
+                            <a:schemeClr val="bg1"/>
+                          </a:solidFill>
+                        </a:rPr>
+                        <a:t>1</a:t>
+                      </a:r>
+                      <a:endParaRPr lang="de-DE" dirty="0">
+                        <a:solidFill>
+                          <a:schemeClr val="bg1"/>
+                        </a:solidFill>
+                      </a:endParaRPr>
+                    </a:p>
+                  </a:txBody>
+                  <a:tcPr>
+                    <a:lnL w="28575" cap="flat" cmpd="sng" algn="ctr">
+                      <a:solidFill>
+                        <a:schemeClr val="bg1"/>
+                      </a:solidFill>
+                      <a:prstDash val="solid"/>
+                      <a:round/>
+                      <a:headEnd type="none" w="med" len="med"/>
+                      <a:tailEnd type="none" w="med" len="med"/>
+                    </a:lnL>
+                    <a:lnR w="28575" cap="flat" cmpd="sng" algn="ctr">
+                      <a:solidFill>
+                        <a:schemeClr val="bg1"/>
+                      </a:solidFill>
+                      <a:prstDash val="solid"/>
+                      <a:round/>
+                      <a:headEnd type="none" w="med" len="med"/>
+                      <a:tailEnd type="none" w="med" len="med"/>
+                    </a:lnR>
+                    <a:lnT w="28575" cap="flat" cmpd="sng" algn="ctr">
+                      <a:solidFill>
+                        <a:schemeClr val="bg1"/>
+                      </a:solidFill>
+                      <a:prstDash val="solid"/>
+                      <a:round/>
+                      <a:headEnd type="none" w="med" len="med"/>
+                      <a:tailEnd type="none" w="med" len="med"/>
+                    </a:lnT>
+                    <a:lnB w="28575" cap="flat" cmpd="sng" algn="ctr">
+                      <a:solidFill>
+                        <a:schemeClr val="bg1"/>
+                      </a:solidFill>
+                      <a:prstDash val="solid"/>
+                      <a:round/>
+                      <a:headEnd type="none" w="med" len="med"/>
+                      <a:tailEnd type="none" w="med" len="med"/>
+                    </a:lnB>
+                  </a:tcPr>
+                </a:tc>
+                <a:tc>
+                  <a:txBody>
+                    <a:bodyPr/>
+                    <a:lstStyle/>
+                    <a:p>
+                      <a:r>
+                        <a:rPr lang="de-DE" dirty="0" smtClean="0">
+                          <a:solidFill>
+                            <a:schemeClr val="bg1"/>
+                          </a:solidFill>
+                        </a:rPr>
+                        <a:t>1</a:t>
+                      </a:r>
+                      <a:endParaRPr lang="de-DE" dirty="0">
+                        <a:solidFill>
+                          <a:schemeClr val="bg1"/>
+                        </a:solidFill>
+                      </a:endParaRPr>
+                    </a:p>
+                  </a:txBody>
+                  <a:tcPr>
+                    <a:lnL w="28575" cap="flat" cmpd="sng" algn="ctr">
+                      <a:solidFill>
+                        <a:schemeClr val="bg1"/>
+                      </a:solidFill>
+                      <a:prstDash val="solid"/>
+                      <a:round/>
+                      <a:headEnd type="none" w="med" len="med"/>
+                      <a:tailEnd type="none" w="med" len="med"/>
+                    </a:lnL>
+                    <a:lnR w="28575" cap="flat" cmpd="sng" algn="ctr">
+                      <a:solidFill>
+                        <a:schemeClr val="bg1"/>
+                      </a:solidFill>
+                      <a:prstDash val="solid"/>
+                      <a:round/>
+                      <a:headEnd type="none" w="med" len="med"/>
+                      <a:tailEnd type="none" w="med" len="med"/>
+                    </a:lnR>
+                    <a:lnT w="28575" cap="flat" cmpd="sng" algn="ctr">
+                      <a:solidFill>
+                        <a:schemeClr val="bg1"/>
+                      </a:solidFill>
+                      <a:prstDash val="solid"/>
+                      <a:round/>
+                      <a:headEnd type="none" w="med" len="med"/>
+                      <a:tailEnd type="none" w="med" len="med"/>
+                    </a:lnT>
+                    <a:lnB w="28575" cap="flat" cmpd="sng" algn="ctr">
+                      <a:solidFill>
+                        <a:schemeClr val="bg1"/>
+                      </a:solidFill>
+                      <a:prstDash val="solid"/>
+                      <a:round/>
+                      <a:headEnd type="none" w="med" len="med"/>
+                      <a:tailEnd type="none" w="med" len="med"/>
+                    </a:lnB>
+                  </a:tcPr>
+                </a:tc>
+                <a:tc>
+                  <a:txBody>
+                    <a:bodyPr/>
+                    <a:lstStyle/>
+                    <a:p>
+                      <a:r>
+                        <a:rPr lang="de-DE" dirty="0" smtClean="0">
+                          <a:solidFill>
+                            <a:schemeClr val="bg1"/>
+                          </a:solidFill>
+                        </a:rPr>
+                        <a:t>+</a:t>
+                      </a:r>
+                      <a:endParaRPr lang="de-DE" dirty="0">
+                        <a:solidFill>
+                          <a:schemeClr val="bg1"/>
+                        </a:solidFill>
+                      </a:endParaRPr>
+                    </a:p>
+                  </a:txBody>
+                  <a:tcPr>
+                    <a:lnL w="28575" cap="flat" cmpd="sng" algn="ctr">
+                      <a:solidFill>
+                        <a:schemeClr val="bg1"/>
+                      </a:solidFill>
+                      <a:prstDash val="solid"/>
+                      <a:round/>
+                      <a:headEnd type="none" w="med" len="med"/>
+                      <a:tailEnd type="none" w="med" len="med"/>
+                    </a:lnL>
+                    <a:lnR w="28575" cap="flat" cmpd="sng" algn="ctr">
+                      <a:solidFill>
+                        <a:schemeClr val="bg1"/>
+                      </a:solidFill>
+                      <a:prstDash val="solid"/>
+                      <a:round/>
+                      <a:headEnd type="none" w="med" len="med"/>
+                      <a:tailEnd type="none" w="med" len="med"/>
+                    </a:lnR>
+                    <a:lnT w="28575" cap="flat" cmpd="sng" algn="ctr">
+                      <a:solidFill>
+                        <a:schemeClr val="bg1"/>
+                      </a:solidFill>
+                      <a:prstDash val="solid"/>
+                      <a:round/>
+                      <a:headEnd type="none" w="med" len="med"/>
+                      <a:tailEnd type="none" w="med" len="med"/>
+                    </a:lnT>
+                    <a:lnB w="28575" cap="flat" cmpd="sng" algn="ctr">
+                      <a:solidFill>
+                        <a:schemeClr val="bg1"/>
+                      </a:solidFill>
+                      <a:prstDash val="solid"/>
+                      <a:round/>
+                      <a:headEnd type="none" w="med" len="med"/>
+                      <a:tailEnd type="none" w="med" len="med"/>
+                    </a:lnB>
+                  </a:tcPr>
+                </a:tc>
+                <a:extLst>
+                  <a:ext uri="{0D108BD9-81ED-4DB2-BD59-A6C34878D82A}">
+                    <a16:rowId xmlns:a16="http://schemas.microsoft.com/office/drawing/2014/main" val="2290084837"/>
+                  </a:ext>
+                </a:extLst>
+              </a:tr>
+              <a:tr h="370840">
+                <a:tc>
+                  <a:txBody>
+                    <a:bodyPr/>
+                    <a:lstStyle/>
+                    <a:p>
+                      <a:r>
+                        <a:rPr lang="de-DE" dirty="0" smtClean="0">
+                          <a:solidFill>
+                            <a:schemeClr val="bg1"/>
+                          </a:solidFill>
+                        </a:rPr>
+                        <a:t>1</a:t>
+                      </a:r>
+                      <a:endParaRPr lang="de-DE" dirty="0">
+                        <a:solidFill>
+                          <a:schemeClr val="bg1"/>
+                        </a:solidFill>
+                      </a:endParaRPr>
+                    </a:p>
+                  </a:txBody>
+                  <a:tcPr>
+                    <a:lnL w="28575" cap="flat" cmpd="sng" algn="ctr">
+                      <a:solidFill>
+                        <a:schemeClr val="bg1"/>
+                      </a:solidFill>
+                      <a:prstDash val="solid"/>
+                      <a:round/>
+                      <a:headEnd type="none" w="med" len="med"/>
+                      <a:tailEnd type="none" w="med" len="med"/>
+                    </a:lnL>
+                    <a:lnR w="28575" cap="flat" cmpd="sng" algn="ctr">
+                      <a:solidFill>
+                        <a:schemeClr val="bg1"/>
+                      </a:solidFill>
+                      <a:prstDash val="solid"/>
+                      <a:round/>
+                      <a:headEnd type="none" w="med" len="med"/>
+                      <a:tailEnd type="none" w="med" len="med"/>
+                    </a:lnR>
+                    <a:lnT w="28575" cap="flat" cmpd="sng" algn="ctr">
+                      <a:solidFill>
+                        <a:schemeClr val="bg1"/>
+                      </a:solidFill>
+                      <a:prstDash val="solid"/>
+                      <a:round/>
+                      <a:headEnd type="none" w="med" len="med"/>
+                      <a:tailEnd type="none" w="med" len="med"/>
+                    </a:lnT>
+                    <a:lnB w="28575" cap="flat" cmpd="sng" algn="ctr">
+                      <a:solidFill>
+                        <a:schemeClr val="bg1"/>
+                      </a:solidFill>
+                      <a:prstDash val="solid"/>
+                      <a:round/>
+                      <a:headEnd type="none" w="med" len="med"/>
+                      <a:tailEnd type="none" w="med" len="med"/>
+                    </a:lnB>
+                  </a:tcPr>
+                </a:tc>
+                <a:tc>
+                  <a:txBody>
+                    <a:bodyPr/>
+                    <a:lstStyle/>
+                    <a:p>
+                      <a:r>
+                        <a:rPr lang="de-DE" dirty="0" smtClean="0">
+                          <a:solidFill>
+                            <a:schemeClr val="bg1"/>
+                          </a:solidFill>
+                        </a:rPr>
+                        <a:t>0</a:t>
+                      </a:r>
+                      <a:endParaRPr lang="de-DE" dirty="0">
+                        <a:solidFill>
+                          <a:schemeClr val="bg1"/>
+                        </a:solidFill>
+                      </a:endParaRPr>
+                    </a:p>
+                  </a:txBody>
+                  <a:tcPr>
+                    <a:lnL w="28575" cap="flat" cmpd="sng" algn="ctr">
+                      <a:solidFill>
+                        <a:schemeClr val="bg1"/>
+                      </a:solidFill>
+                      <a:prstDash val="solid"/>
+                      <a:round/>
+                      <a:headEnd type="none" w="med" len="med"/>
+                      <a:tailEnd type="none" w="med" len="med"/>
+                    </a:lnL>
+                    <a:lnR w="28575" cap="flat" cmpd="sng" algn="ctr">
+                      <a:solidFill>
+                        <a:schemeClr val="bg1"/>
+                      </a:solidFill>
+                      <a:prstDash val="solid"/>
+                      <a:round/>
+                      <a:headEnd type="none" w="med" len="med"/>
+                      <a:tailEnd type="none" w="med" len="med"/>
+                    </a:lnR>
+                    <a:lnT w="28575" cap="flat" cmpd="sng" algn="ctr">
+                      <a:solidFill>
+                        <a:schemeClr val="bg1"/>
+                      </a:solidFill>
+                      <a:prstDash val="solid"/>
+                      <a:round/>
+                      <a:headEnd type="none" w="med" len="med"/>
+                      <a:tailEnd type="none" w="med" len="med"/>
+                    </a:lnT>
+                    <a:lnB w="28575" cap="flat" cmpd="sng" algn="ctr">
+                      <a:solidFill>
+                        <a:schemeClr val="bg1"/>
+                      </a:solidFill>
+                      <a:prstDash val="solid"/>
+                      <a:round/>
+                      <a:headEnd type="none" w="med" len="med"/>
+                      <a:tailEnd type="none" w="med" len="med"/>
+                    </a:lnB>
+                  </a:tcPr>
+                </a:tc>
+                <a:tc>
+                  <a:txBody>
+                    <a:bodyPr/>
+                    <a:lstStyle/>
+                    <a:p>
+                      <a:r>
+                        <a:rPr lang="de-DE" dirty="0" smtClean="0">
+                          <a:solidFill>
+                            <a:schemeClr val="bg1"/>
+                          </a:solidFill>
+                        </a:rPr>
+                        <a:t>-</a:t>
+                      </a:r>
+                    </a:p>
+                  </a:txBody>
+                  <a:tcPr>
+                    <a:lnL w="28575" cap="flat" cmpd="sng" algn="ctr">
+                      <a:solidFill>
+                        <a:schemeClr val="bg1"/>
+                      </a:solidFill>
+                      <a:prstDash val="solid"/>
+                      <a:round/>
+                      <a:headEnd type="none" w="med" len="med"/>
+                      <a:tailEnd type="none" w="med" len="med"/>
+                    </a:lnL>
+                    <a:lnR w="28575" cap="flat" cmpd="sng" algn="ctr">
+                      <a:solidFill>
+                        <a:schemeClr val="bg1"/>
+                      </a:solidFill>
+                      <a:prstDash val="solid"/>
+                      <a:round/>
+                      <a:headEnd type="none" w="med" len="med"/>
+                      <a:tailEnd type="none" w="med" len="med"/>
+                    </a:lnR>
+                    <a:lnT w="28575" cap="flat" cmpd="sng" algn="ctr">
+                      <a:solidFill>
+                        <a:schemeClr val="bg1"/>
+                      </a:solidFill>
+                      <a:prstDash val="solid"/>
+                      <a:round/>
+                      <a:headEnd type="none" w="med" len="med"/>
+                      <a:tailEnd type="none" w="med" len="med"/>
+                    </a:lnT>
+                    <a:lnB w="28575" cap="flat" cmpd="sng" algn="ctr">
+                      <a:solidFill>
+                        <a:schemeClr val="bg1"/>
+                      </a:solidFill>
+                      <a:prstDash val="solid"/>
+                      <a:round/>
+                      <a:headEnd type="none" w="med" len="med"/>
+                      <a:tailEnd type="none" w="med" len="med"/>
+                    </a:lnB>
+                  </a:tcPr>
+                </a:tc>
+                <a:extLst>
+                  <a:ext uri="{0D108BD9-81ED-4DB2-BD59-A6C34878D82A}">
+                    <a16:rowId xmlns:a16="http://schemas.microsoft.com/office/drawing/2014/main" val="595724652"/>
+                  </a:ext>
+                </a:extLst>
+              </a:tr>
+              <a:tr h="370840">
+                <a:tc>
+                  <a:txBody>
+                    <a:bodyPr/>
+                    <a:lstStyle/>
+                    <a:p>
+                      <a:r>
+                        <a:rPr lang="de-DE" dirty="0" smtClean="0">
+                          <a:solidFill>
+                            <a:schemeClr val="bg1"/>
+                          </a:solidFill>
+                        </a:rPr>
+                        <a:t>0</a:t>
+                      </a:r>
+                      <a:endParaRPr lang="de-DE" dirty="0">
+                        <a:solidFill>
+                          <a:schemeClr val="bg1"/>
+                        </a:solidFill>
+                      </a:endParaRPr>
+                    </a:p>
+                  </a:txBody>
+                  <a:tcPr>
+                    <a:lnL w="28575" cap="flat" cmpd="sng" algn="ctr">
+                      <a:solidFill>
+                        <a:schemeClr val="bg1"/>
+                      </a:solidFill>
+                      <a:prstDash val="solid"/>
+                      <a:round/>
+                      <a:headEnd type="none" w="med" len="med"/>
+                      <a:tailEnd type="none" w="med" len="med"/>
+                    </a:lnL>
+                    <a:lnR w="28575" cap="flat" cmpd="sng" algn="ctr">
+                      <a:solidFill>
+                        <a:schemeClr val="bg1"/>
+                      </a:solidFill>
+                      <a:prstDash val="solid"/>
+                      <a:round/>
+                      <a:headEnd type="none" w="med" len="med"/>
+                      <a:tailEnd type="none" w="med" len="med"/>
+                    </a:lnR>
+                    <a:lnT w="28575" cap="flat" cmpd="sng" algn="ctr">
+                      <a:solidFill>
+                        <a:schemeClr val="bg1"/>
+                      </a:solidFill>
+                      <a:prstDash val="solid"/>
+                      <a:round/>
+                      <a:headEnd type="none" w="med" len="med"/>
+                      <a:tailEnd type="none" w="med" len="med"/>
+                    </a:lnT>
+                    <a:lnB w="28575" cap="flat" cmpd="sng" algn="ctr">
+                      <a:solidFill>
+                        <a:schemeClr val="bg1"/>
+                      </a:solidFill>
+                      <a:prstDash val="solid"/>
+                      <a:round/>
+                      <a:headEnd type="none" w="med" len="med"/>
+                      <a:tailEnd type="none" w="med" len="med"/>
+                    </a:lnB>
+                  </a:tcPr>
+                </a:tc>
+                <a:tc>
+                  <a:txBody>
+                    <a:bodyPr/>
+                    <a:lstStyle/>
+                    <a:p>
+                      <a:r>
+                        <a:rPr lang="de-DE" dirty="0" smtClean="0">
+                          <a:solidFill>
+                            <a:schemeClr val="bg1"/>
+                          </a:solidFill>
+                        </a:rPr>
+                        <a:t>1</a:t>
+                      </a:r>
+                      <a:endParaRPr lang="de-DE" dirty="0">
+                        <a:solidFill>
+                          <a:schemeClr val="bg1"/>
+                        </a:solidFill>
+                      </a:endParaRPr>
+                    </a:p>
+                  </a:txBody>
+                  <a:tcPr>
+                    <a:lnL w="28575" cap="flat" cmpd="sng" algn="ctr">
+                      <a:solidFill>
+                        <a:schemeClr val="bg1"/>
+                      </a:solidFill>
+                      <a:prstDash val="solid"/>
+                      <a:round/>
+                      <a:headEnd type="none" w="med" len="med"/>
+                      <a:tailEnd type="none" w="med" len="med"/>
+                    </a:lnL>
+                    <a:lnR w="28575" cap="flat" cmpd="sng" algn="ctr">
+                      <a:solidFill>
+                        <a:schemeClr val="bg1"/>
+                      </a:solidFill>
+                      <a:prstDash val="solid"/>
+                      <a:round/>
+                      <a:headEnd type="none" w="med" len="med"/>
+                      <a:tailEnd type="none" w="med" len="med"/>
+                    </a:lnR>
+                    <a:lnT w="28575" cap="flat" cmpd="sng" algn="ctr">
+                      <a:solidFill>
+                        <a:schemeClr val="bg1"/>
+                      </a:solidFill>
+                      <a:prstDash val="solid"/>
+                      <a:round/>
+                      <a:headEnd type="none" w="med" len="med"/>
+                      <a:tailEnd type="none" w="med" len="med"/>
+                    </a:lnT>
+                    <a:lnB w="28575" cap="flat" cmpd="sng" algn="ctr">
+                      <a:solidFill>
+                        <a:schemeClr val="bg1"/>
+                      </a:solidFill>
+                      <a:prstDash val="solid"/>
+                      <a:round/>
+                      <a:headEnd type="none" w="med" len="med"/>
+                      <a:tailEnd type="none" w="med" len="med"/>
+                    </a:lnB>
+                  </a:tcPr>
+                </a:tc>
+                <a:tc>
+                  <a:txBody>
+                    <a:bodyPr/>
+                    <a:lstStyle/>
+                    <a:p>
+                      <a:r>
+                        <a:rPr lang="de-DE" dirty="0" smtClean="0">
+                          <a:solidFill>
+                            <a:schemeClr val="bg1"/>
+                          </a:solidFill>
+                        </a:rPr>
+                        <a:t>-</a:t>
+                      </a:r>
+                    </a:p>
+                  </a:txBody>
+                  <a:tcPr>
+                    <a:lnL w="28575" cap="flat" cmpd="sng" algn="ctr">
+                      <a:solidFill>
+                        <a:schemeClr val="bg1"/>
+                      </a:solidFill>
+                      <a:prstDash val="solid"/>
+                      <a:round/>
+                      <a:headEnd type="none" w="med" len="med"/>
+                      <a:tailEnd type="none" w="med" len="med"/>
+                    </a:lnL>
+                    <a:lnR w="28575" cap="flat" cmpd="sng" algn="ctr">
+                      <a:solidFill>
+                        <a:schemeClr val="bg1"/>
+                      </a:solidFill>
+                      <a:prstDash val="solid"/>
+                      <a:round/>
+                      <a:headEnd type="none" w="med" len="med"/>
+                      <a:tailEnd type="none" w="med" len="med"/>
+                    </a:lnR>
+                    <a:lnT w="28575" cap="flat" cmpd="sng" algn="ctr">
+                      <a:solidFill>
+                        <a:schemeClr val="bg1"/>
+                      </a:solidFill>
+                      <a:prstDash val="solid"/>
+                      <a:round/>
+                      <a:headEnd type="none" w="med" len="med"/>
+                      <a:tailEnd type="none" w="med" len="med"/>
+                    </a:lnT>
+                    <a:lnB w="28575" cap="flat" cmpd="sng" algn="ctr">
+                      <a:solidFill>
+                        <a:schemeClr val="bg1"/>
+                      </a:solidFill>
+                      <a:prstDash val="solid"/>
+                      <a:round/>
+                      <a:headEnd type="none" w="med" len="med"/>
+                      <a:tailEnd type="none" w="med" len="med"/>
+                    </a:lnB>
+                  </a:tcPr>
+                </a:tc>
+                <a:extLst>
+                  <a:ext uri="{0D108BD9-81ED-4DB2-BD59-A6C34878D82A}">
+                    <a16:rowId xmlns:a16="http://schemas.microsoft.com/office/drawing/2014/main" val="4241964610"/>
+                  </a:ext>
+                </a:extLst>
+              </a:tr>
+              <a:tr h="370840">
+                <a:tc>
+                  <a:txBody>
+                    <a:bodyPr/>
+                    <a:lstStyle/>
+                    <a:p>
+                      <a:r>
+                        <a:rPr lang="de-DE" dirty="0" smtClean="0">
+                          <a:solidFill>
+                            <a:schemeClr val="bg1"/>
+                          </a:solidFill>
+                        </a:rPr>
+                        <a:t>0</a:t>
+                      </a:r>
+                      <a:endParaRPr lang="de-DE" dirty="0">
+                        <a:solidFill>
+                          <a:schemeClr val="bg1"/>
+                        </a:solidFill>
+                      </a:endParaRPr>
+                    </a:p>
+                  </a:txBody>
+                  <a:tcPr>
+                    <a:lnL w="28575" cap="flat" cmpd="sng" algn="ctr">
+                      <a:solidFill>
+                        <a:schemeClr val="bg1"/>
+                      </a:solidFill>
+                      <a:prstDash val="solid"/>
+                      <a:round/>
+                      <a:headEnd type="none" w="med" len="med"/>
+                      <a:tailEnd type="none" w="med" len="med"/>
+                    </a:lnL>
+                    <a:lnR w="28575" cap="flat" cmpd="sng" algn="ctr">
+                      <a:solidFill>
+                        <a:schemeClr val="bg1"/>
+                      </a:solidFill>
+                      <a:prstDash val="solid"/>
+                      <a:round/>
+                      <a:headEnd type="none" w="med" len="med"/>
+                      <a:tailEnd type="none" w="med" len="med"/>
+                    </a:lnR>
+                    <a:lnT w="28575" cap="flat" cmpd="sng" algn="ctr">
+                      <a:solidFill>
+                        <a:schemeClr val="bg1"/>
+                      </a:solidFill>
+                      <a:prstDash val="solid"/>
+                      <a:round/>
+                      <a:headEnd type="none" w="med" len="med"/>
+                      <a:tailEnd type="none" w="med" len="med"/>
+                    </a:lnT>
+                    <a:lnB w="28575" cap="flat" cmpd="sng" algn="ctr">
+                      <a:solidFill>
+                        <a:schemeClr val="bg1"/>
+                      </a:solidFill>
+                      <a:prstDash val="solid"/>
+                      <a:round/>
+                      <a:headEnd type="none" w="med" len="med"/>
+                      <a:tailEnd type="none" w="med" len="med"/>
+                    </a:lnB>
+                  </a:tcPr>
+                </a:tc>
+                <a:tc>
+                  <a:txBody>
+                    <a:bodyPr/>
+                    <a:lstStyle/>
+                    <a:p>
+                      <a:r>
+                        <a:rPr lang="de-DE" dirty="0" smtClean="0">
+                          <a:solidFill>
+                            <a:schemeClr val="bg1"/>
+                          </a:solidFill>
+                        </a:rPr>
+                        <a:t>0</a:t>
+                      </a:r>
+                      <a:endParaRPr lang="de-DE" dirty="0">
+                        <a:solidFill>
+                          <a:schemeClr val="bg1"/>
+                        </a:solidFill>
+                      </a:endParaRPr>
+                    </a:p>
+                  </a:txBody>
+                  <a:tcPr>
+                    <a:lnL w="28575" cap="flat" cmpd="sng" algn="ctr">
+                      <a:solidFill>
+                        <a:schemeClr val="bg1"/>
+                      </a:solidFill>
+                      <a:prstDash val="solid"/>
+                      <a:round/>
+                      <a:headEnd type="none" w="med" len="med"/>
+                      <a:tailEnd type="none" w="med" len="med"/>
+                    </a:lnL>
+                    <a:lnR w="28575" cap="flat" cmpd="sng" algn="ctr">
+                      <a:solidFill>
+                        <a:schemeClr val="bg1"/>
+                      </a:solidFill>
+                      <a:prstDash val="solid"/>
+                      <a:round/>
+                      <a:headEnd type="none" w="med" len="med"/>
+                      <a:tailEnd type="none" w="med" len="med"/>
+                    </a:lnR>
+                    <a:lnT w="28575" cap="flat" cmpd="sng" algn="ctr">
+                      <a:solidFill>
+                        <a:schemeClr val="bg1"/>
+                      </a:solidFill>
+                      <a:prstDash val="solid"/>
+                      <a:round/>
+                      <a:headEnd type="none" w="med" len="med"/>
+                      <a:tailEnd type="none" w="med" len="med"/>
+                    </a:lnT>
+                    <a:lnB w="28575" cap="flat" cmpd="sng" algn="ctr">
+                      <a:solidFill>
+                        <a:schemeClr val="bg1"/>
+                      </a:solidFill>
+                      <a:prstDash val="solid"/>
+                      <a:round/>
+                      <a:headEnd type="none" w="med" len="med"/>
+                      <a:tailEnd type="none" w="med" len="med"/>
+                    </a:lnB>
+                  </a:tcPr>
+                </a:tc>
+                <a:tc>
+                  <a:txBody>
+                    <a:bodyPr/>
+                    <a:lstStyle/>
+                    <a:p>
+                      <a:r>
+                        <a:rPr lang="de-DE" dirty="0" smtClean="0">
+                          <a:solidFill>
+                            <a:schemeClr val="bg1"/>
+                          </a:solidFill>
+                        </a:rPr>
+                        <a:t>+</a:t>
+                      </a:r>
+                    </a:p>
+                  </a:txBody>
+                  <a:tcPr>
+                    <a:lnL w="28575" cap="flat" cmpd="sng" algn="ctr">
+                      <a:solidFill>
+                        <a:schemeClr val="bg1"/>
+                      </a:solidFill>
+                      <a:prstDash val="solid"/>
+                      <a:round/>
+                      <a:headEnd type="none" w="med" len="med"/>
+                      <a:tailEnd type="none" w="med" len="med"/>
+                    </a:lnL>
+                    <a:lnR w="28575" cap="flat" cmpd="sng" algn="ctr">
+                      <a:solidFill>
+                        <a:schemeClr val="bg1"/>
+                      </a:solidFill>
+                      <a:prstDash val="solid"/>
+                      <a:round/>
+                      <a:headEnd type="none" w="med" len="med"/>
+                      <a:tailEnd type="none" w="med" len="med"/>
+                    </a:lnR>
+                    <a:lnT w="28575" cap="flat" cmpd="sng" algn="ctr">
+                      <a:solidFill>
+                        <a:schemeClr val="bg1"/>
+                      </a:solidFill>
+                      <a:prstDash val="solid"/>
+                      <a:round/>
+                      <a:headEnd type="none" w="med" len="med"/>
+                      <a:tailEnd type="none" w="med" len="med"/>
+                    </a:lnT>
+                    <a:lnB w="28575" cap="flat" cmpd="sng" algn="ctr">
+                      <a:solidFill>
+                        <a:schemeClr val="bg1"/>
+                      </a:solidFill>
+                      <a:prstDash val="solid"/>
+                      <a:round/>
+                      <a:headEnd type="none" w="med" len="med"/>
+                      <a:tailEnd type="none" w="med" len="med"/>
+                    </a:lnB>
+                  </a:tcPr>
+                </a:tc>
+                <a:extLst>
+                  <a:ext uri="{0D108BD9-81ED-4DB2-BD59-A6C34878D82A}">
+                    <a16:rowId xmlns:a16="http://schemas.microsoft.com/office/drawing/2014/main" val="277369828"/>
+                  </a:ext>
+                </a:extLst>
+              </a:tr>
+            </a:tbl>
+          </a:graphicData>
+        </a:graphic>
+      </p:graphicFrame>
+    </p:spTree>
+    <p:extLst>
+      <p:ext uri="{BB962C8B-B14F-4D97-AF65-F5344CB8AC3E}">
+        <p14:creationId xmlns:p14="http://schemas.microsoft.com/office/powerpoint/2010/main" val="4258397793"/>
+      </p:ext>
+    </p:extLst>
+  </p:cSld>
+  <p:clrMapOvr>
+    <a:masterClrMapping/>
+  </p:clrMapOvr>
 </p:sld>
 </file>
 

</xml_diff>

<commit_message>
corrected mistake in plot nontime pattern (violinplot)
</commit_message>
<xml_diff>
--- a/9 Documents/Presentation/AAA_presentation.pptx
+++ b/9 Documents/Presentation/AAA_presentation.pptx
@@ -17991,7 +17991,7 @@
       </p:pic>
       <p:pic>
         <p:nvPicPr>
-          <p:cNvPr id="2" name="Grafik 1"/>
+          <p:cNvPr id="3" name="Grafik 2"/>
           <p:cNvPicPr>
             <a:picLocks noChangeAspect="1"/>
           </p:cNvPicPr>
@@ -18011,8 +18011,8 @@
         </p:blipFill>
         <p:spPr>
           <a:xfrm>
-            <a:off x="1012250" y="4003796"/>
-            <a:ext cx="3331649" cy="2765268"/>
+            <a:off x="4673589" y="4003796"/>
+            <a:ext cx="3525719" cy="2633271"/>
           </a:xfrm>
           <a:prstGeom prst="rect">
             <a:avLst/>
@@ -18021,7 +18021,7 @@
       </p:pic>
       <p:pic>
         <p:nvPicPr>
-          <p:cNvPr id="3" name="Grafik 2"/>
+          <p:cNvPr id="4" name="Grafik 3"/>
           <p:cNvPicPr>
             <a:picLocks noChangeAspect="1"/>
           </p:cNvPicPr>
@@ -18041,8 +18041,8 @@
         </p:blipFill>
         <p:spPr>
           <a:xfrm>
-            <a:off x="4673589" y="4003796"/>
-            <a:ext cx="3525719" cy="2633271"/>
+            <a:off x="1272333" y="4003796"/>
+            <a:ext cx="3113369" cy="2584096"/>
           </a:xfrm>
           <a:prstGeom prst="rect">
             <a:avLst/>

</xml_diff>

<commit_message>
Presentation: Fixed wrong historical data model
</commit_message>
<xml_diff>
--- a/9 Documents/Presentation/AAA_presentation.pptx
+++ b/9 Documents/Presentation/AAA_presentation.pptx
@@ -7327,15 +7327,15 @@
           </a:p>
           <a:p>
             <a:r>
-              <a:rPr lang="de-DE" sz="2400" dirty="0" err="1" smtClean="0"/>
+              <a:rPr lang="de-DE" sz="2400" dirty="0" err="1"/>
               <a:t>Expected</a:t>
             </a:r>
             <a:r>
-              <a:rPr lang="de-DE" sz="2400" dirty="0" smtClean="0"/>
+              <a:rPr lang="de-DE" sz="2400" dirty="0"/>
               <a:t> </a:t>
             </a:r>
             <a:r>
-              <a:rPr lang="de-DE" sz="2400" dirty="0" err="1" smtClean="0"/>
+              <a:rPr lang="de-DE" sz="2400" dirty="0" err="1"/>
               <a:t>profit</a:t>
             </a:r>
             <a:endParaRPr lang="de-DE" sz="2400" dirty="0"/>
@@ -7371,7 +7371,7 @@
           <a:lstStyle/>
           <a:p>
             <a:r>
-              <a:rPr lang="de-DE" sz="2000" dirty="0" err="1" smtClean="0">
+              <a:rPr lang="de-DE" sz="2000" dirty="0" err="1">
                 <a:solidFill>
                   <a:schemeClr val="bg1"/>
                 </a:solidFill>
@@ -7380,7 +7380,7 @@
               <a:t>Expected</a:t>
             </a:r>
             <a:r>
-              <a:rPr lang="de-DE" sz="2000" dirty="0" smtClean="0">
+              <a:rPr lang="de-DE" sz="2000" dirty="0">
                 <a:solidFill>
                   <a:schemeClr val="bg1"/>
                 </a:solidFill>
@@ -7389,7 +7389,7 @@
               <a:t> </a:t>
             </a:r>
             <a:r>
-              <a:rPr lang="de-DE" sz="2000" dirty="0" err="1" smtClean="0">
+              <a:rPr lang="de-DE" sz="2000" dirty="0" err="1">
                 <a:solidFill>
                   <a:schemeClr val="bg1"/>
                 </a:solidFill>
@@ -7398,7 +7398,7 @@
               <a:t>profit</a:t>
             </a:r>
             <a:r>
-              <a:rPr lang="de-DE" sz="2000" dirty="0" smtClean="0">
+              <a:rPr lang="de-DE" sz="2000" dirty="0">
                 <a:solidFill>
                   <a:schemeClr val="bg1"/>
                 </a:solidFill>
@@ -7413,19 +7413,10 @@
                 </a:solidFill>
                 <a:latin typeface="Quicksand" pitchFamily="2" charset="77"/>
               </a:rPr>
-              <a:t>M</a:t>
+              <a:t>Mwh</a:t>
             </a:r>
             <a:r>
-              <a:rPr lang="de-DE" sz="2000" dirty="0" err="1" smtClean="0">
-                <a:solidFill>
-                  <a:schemeClr val="bg1"/>
-                </a:solidFill>
-                <a:latin typeface="Quicksand" pitchFamily="2" charset="77"/>
-              </a:rPr>
-              <a:t>wh</a:t>
-            </a:r>
-            <a:r>
-              <a:rPr lang="de-DE" sz="2000" dirty="0" smtClean="0">
+              <a:rPr lang="de-DE" sz="2000" dirty="0">
                 <a:solidFill>
                   <a:schemeClr val="bg1"/>
                 </a:solidFill>
@@ -7434,7 +7425,7 @@
               <a:t>: 0.24 € (TC 78% </a:t>
             </a:r>
             <a:r>
-              <a:rPr lang="de-DE" sz="2000" dirty="0" err="1" smtClean="0">
+              <a:rPr lang="de-DE" sz="2000" dirty="0" err="1">
                 <a:solidFill>
                   <a:schemeClr val="bg1"/>
                 </a:solidFill>
@@ -7443,7 +7434,7 @@
               <a:t>accuracy</a:t>
             </a:r>
             <a:r>
-              <a:rPr lang="de-DE" sz="2000" dirty="0" smtClean="0">
+              <a:rPr lang="de-DE" sz="2000" dirty="0">
                 <a:solidFill>
                   <a:schemeClr val="bg1"/>
                 </a:solidFill>
@@ -7451,12 +7442,6 @@
               </a:rPr>
               <a:t>)</a:t>
             </a:r>
-            <a:endParaRPr lang="de-DE" sz="2000" dirty="0">
-              <a:solidFill>
-                <a:schemeClr val="bg1"/>
-              </a:solidFill>
-              <a:latin typeface="Quicksand" pitchFamily="2" charset="77"/>
-            </a:endParaRPr>
           </a:p>
         </p:txBody>
       </p:sp>
@@ -7514,7 +7499,7 @@
                     <a:lstStyle/>
                     <a:p>
                       <a:r>
-                        <a:rPr lang="de-DE" dirty="0" err="1" smtClean="0">
+                        <a:rPr lang="de-DE" dirty="0" err="1">
                           <a:solidFill>
                             <a:schemeClr val="bg1"/>
                           </a:solidFill>
@@ -7573,7 +7558,7 @@
                     <a:lstStyle/>
                     <a:p>
                       <a:r>
-                        <a:rPr lang="de-DE" dirty="0" err="1" smtClean="0">
+                        <a:rPr lang="de-DE" dirty="0" err="1">
                           <a:solidFill>
                             <a:schemeClr val="bg1"/>
                           </a:solidFill>
@@ -7632,7 +7617,7 @@
                     <a:lstStyle/>
                     <a:p>
                       <a:r>
-                        <a:rPr lang="de-DE" dirty="0" smtClean="0">
+                        <a:rPr lang="de-DE" dirty="0">
                           <a:solidFill>
                             <a:schemeClr val="bg1"/>
                           </a:solidFill>
@@ -7640,7 +7625,7 @@
                         <a:t>Cash</a:t>
                       </a:r>
                       <a:r>
-                        <a:rPr lang="de-DE" baseline="0" dirty="0" smtClean="0">
+                        <a:rPr lang="de-DE" baseline="0" dirty="0">
                           <a:solidFill>
                             <a:schemeClr val="bg1"/>
                           </a:solidFill>
@@ -7648,7 +7633,7 @@
                         <a:t> </a:t>
                       </a:r>
                       <a:r>
-                        <a:rPr lang="de-DE" baseline="0" dirty="0" err="1" smtClean="0">
+                        <a:rPr lang="de-DE" baseline="0" dirty="0" err="1">
                           <a:solidFill>
                             <a:schemeClr val="bg1"/>
                           </a:solidFill>
@@ -7714,18 +7699,13 @@
                     <a:lstStyle/>
                     <a:p>
                       <a:r>
-                        <a:rPr lang="de-DE" dirty="0" smtClean="0">
+                        <a:rPr lang="de-DE" dirty="0">
                           <a:solidFill>
                             <a:schemeClr val="bg1"/>
                           </a:solidFill>
                         </a:rPr>
                         <a:t>1</a:t>
                       </a:r>
-                      <a:endParaRPr lang="de-DE" dirty="0">
-                        <a:solidFill>
-                          <a:schemeClr val="bg1"/>
-                        </a:solidFill>
-                      </a:endParaRPr>
                     </a:p>
                   </a:txBody>
                   <a:tcPr>
@@ -7773,18 +7753,13 @@
                     <a:lstStyle/>
                     <a:p>
                       <a:r>
-                        <a:rPr lang="de-DE" dirty="0" smtClean="0">
+                        <a:rPr lang="de-DE" dirty="0">
                           <a:solidFill>
                             <a:schemeClr val="bg1"/>
                           </a:solidFill>
                         </a:rPr>
                         <a:t>1</a:t>
                       </a:r>
-                      <a:endParaRPr lang="de-DE" dirty="0">
-                        <a:solidFill>
-                          <a:schemeClr val="bg1"/>
-                        </a:solidFill>
-                      </a:endParaRPr>
                     </a:p>
                   </a:txBody>
                   <a:tcPr>
@@ -7832,18 +7807,13 @@
                     <a:lstStyle/>
                     <a:p>
                       <a:r>
-                        <a:rPr lang="de-DE" dirty="0" smtClean="0">
+                        <a:rPr lang="de-DE" dirty="0">
                           <a:solidFill>
                             <a:schemeClr val="bg1"/>
                           </a:solidFill>
                         </a:rPr>
                         <a:t>+</a:t>
                       </a:r>
-                      <a:endParaRPr lang="de-DE" dirty="0">
-                        <a:solidFill>
-                          <a:schemeClr val="bg1"/>
-                        </a:solidFill>
-                      </a:endParaRPr>
                     </a:p>
                   </a:txBody>
                   <a:tcPr>
@@ -7898,18 +7868,13 @@
                     <a:lstStyle/>
                     <a:p>
                       <a:r>
-                        <a:rPr lang="de-DE" dirty="0" smtClean="0">
+                        <a:rPr lang="de-DE" dirty="0">
                           <a:solidFill>
                             <a:schemeClr val="bg1"/>
                           </a:solidFill>
                         </a:rPr>
                         <a:t>1</a:t>
                       </a:r>
-                      <a:endParaRPr lang="de-DE" dirty="0">
-                        <a:solidFill>
-                          <a:schemeClr val="bg1"/>
-                        </a:solidFill>
-                      </a:endParaRPr>
                     </a:p>
                   </a:txBody>
                   <a:tcPr>
@@ -7957,18 +7922,13 @@
                     <a:lstStyle/>
                     <a:p>
                       <a:r>
-                        <a:rPr lang="de-DE" dirty="0" smtClean="0">
+                        <a:rPr lang="de-DE" dirty="0">
                           <a:solidFill>
                             <a:schemeClr val="bg1"/>
                           </a:solidFill>
                         </a:rPr>
                         <a:t>0</a:t>
                       </a:r>
-                      <a:endParaRPr lang="de-DE" dirty="0">
-                        <a:solidFill>
-                          <a:schemeClr val="bg1"/>
-                        </a:solidFill>
-                      </a:endParaRPr>
                     </a:p>
                   </a:txBody>
                   <a:tcPr>
@@ -8016,7 +7976,7 @@
                     <a:lstStyle/>
                     <a:p>
                       <a:r>
-                        <a:rPr lang="de-DE" dirty="0" smtClean="0">
+                        <a:rPr lang="de-DE" dirty="0">
                           <a:solidFill>
                             <a:schemeClr val="bg1"/>
                           </a:solidFill>
@@ -8077,18 +8037,13 @@
                     <a:lstStyle/>
                     <a:p>
                       <a:r>
-                        <a:rPr lang="de-DE" dirty="0" smtClean="0">
+                        <a:rPr lang="de-DE" dirty="0">
                           <a:solidFill>
                             <a:schemeClr val="bg1"/>
                           </a:solidFill>
                         </a:rPr>
                         <a:t>0</a:t>
                       </a:r>
-                      <a:endParaRPr lang="de-DE" dirty="0">
-                        <a:solidFill>
-                          <a:schemeClr val="bg1"/>
-                        </a:solidFill>
-                      </a:endParaRPr>
                     </a:p>
                   </a:txBody>
                   <a:tcPr>
@@ -8136,18 +8091,13 @@
                     <a:lstStyle/>
                     <a:p>
                       <a:r>
-                        <a:rPr lang="de-DE" dirty="0" smtClean="0">
+                        <a:rPr lang="de-DE" dirty="0">
                           <a:solidFill>
                             <a:schemeClr val="bg1"/>
                           </a:solidFill>
                         </a:rPr>
                         <a:t>1</a:t>
                       </a:r>
-                      <a:endParaRPr lang="de-DE" dirty="0">
-                        <a:solidFill>
-                          <a:schemeClr val="bg1"/>
-                        </a:solidFill>
-                      </a:endParaRPr>
                     </a:p>
                   </a:txBody>
                   <a:tcPr>
@@ -8195,7 +8145,7 @@
                     <a:lstStyle/>
                     <a:p>
                       <a:r>
-                        <a:rPr lang="de-DE" dirty="0" smtClean="0">
+                        <a:rPr lang="de-DE" dirty="0">
                           <a:solidFill>
                             <a:schemeClr val="bg1"/>
                           </a:solidFill>
@@ -8256,18 +8206,13 @@
                     <a:lstStyle/>
                     <a:p>
                       <a:r>
-                        <a:rPr lang="de-DE" dirty="0" smtClean="0">
+                        <a:rPr lang="de-DE" dirty="0">
                           <a:solidFill>
                             <a:schemeClr val="bg1"/>
                           </a:solidFill>
                         </a:rPr>
                         <a:t>0</a:t>
                       </a:r>
-                      <a:endParaRPr lang="de-DE" dirty="0">
-                        <a:solidFill>
-                          <a:schemeClr val="bg1"/>
-                        </a:solidFill>
-                      </a:endParaRPr>
                     </a:p>
                   </a:txBody>
                   <a:tcPr>
@@ -8315,18 +8260,13 @@
                     <a:lstStyle/>
                     <a:p>
                       <a:r>
-                        <a:rPr lang="de-DE" dirty="0" smtClean="0">
+                        <a:rPr lang="de-DE" dirty="0">
                           <a:solidFill>
                             <a:schemeClr val="bg1"/>
                           </a:solidFill>
                         </a:rPr>
                         <a:t>0</a:t>
                       </a:r>
-                      <a:endParaRPr lang="de-DE" dirty="0">
-                        <a:solidFill>
-                          <a:schemeClr val="bg1"/>
-                        </a:solidFill>
-                      </a:endParaRPr>
                     </a:p>
                   </a:txBody>
                   <a:tcPr>
@@ -8374,7 +8314,7 @@
                     <a:lstStyle/>
                     <a:p>
                       <a:r>
-                        <a:rPr lang="de-DE" dirty="0" smtClean="0">
+                        <a:rPr lang="de-DE" dirty="0">
                           <a:solidFill>
                             <a:schemeClr val="bg1"/>
                           </a:solidFill>
@@ -15805,36 +15745,6 @@
           </a:p>
         </p:txBody>
       </p:sp>
-      <p:pic>
-        <p:nvPicPr>
-          <p:cNvPr id="3" name="Grafik 2">
-            <a:extLst>
-              <a:ext uri="{FF2B5EF4-FFF2-40B4-BE49-F238E27FC236}">
-                <a16:creationId xmlns:a16="http://schemas.microsoft.com/office/drawing/2014/main" id="{ED3DF33D-648C-2B4A-A390-2B0CF197576A}"/>
-              </a:ext>
-            </a:extLst>
-          </p:cNvPr>
-          <p:cNvPicPr>
-            <a:picLocks noChangeAspect="1"/>
-          </p:cNvPicPr>
-          <p:nvPr/>
-        </p:nvPicPr>
-        <p:blipFill>
-          <a:blip r:embed="rId3"/>
-          <a:stretch>
-            <a:fillRect/>
-          </a:stretch>
-        </p:blipFill>
-        <p:spPr>
-          <a:xfrm>
-            <a:off x="1338117" y="2672916"/>
-            <a:ext cx="7824495" cy="3564396"/>
-          </a:xfrm>
-          <a:prstGeom prst="rect">
-            <a:avLst/>
-          </a:prstGeom>
-        </p:spPr>
-      </p:pic>
       <p:sp>
         <p:nvSpPr>
           <p:cNvPr id="5" name="Google Shape;76;p13">
@@ -16431,6 +16341,36 @@
           </a:p>
         </p:txBody>
       </p:sp>
+      <p:pic>
+        <p:nvPicPr>
+          <p:cNvPr id="4" name="Grafik 3">
+            <a:extLst>
+              <a:ext uri="{FF2B5EF4-FFF2-40B4-BE49-F238E27FC236}">
+                <a16:creationId xmlns:a16="http://schemas.microsoft.com/office/drawing/2014/main" id="{422B37BB-1093-434B-B3E2-8F5DB2B83E19}"/>
+              </a:ext>
+            </a:extLst>
+          </p:cNvPr>
+          <p:cNvPicPr>
+            <a:picLocks noChangeAspect="1"/>
+          </p:cNvPicPr>
+          <p:nvPr/>
+        </p:nvPicPr>
+        <p:blipFill>
+          <a:blip r:embed="rId3"/>
+          <a:stretch>
+            <a:fillRect/>
+          </a:stretch>
+        </p:blipFill>
+        <p:spPr>
+          <a:xfrm>
+            <a:off x="1259632" y="2712160"/>
+            <a:ext cx="8280920" cy="3772319"/>
+          </a:xfrm>
+          <a:prstGeom prst="rect">
+            <a:avLst/>
+          </a:prstGeom>
+        </p:spPr>
+      </p:pic>
     </p:spTree>
   </p:cSld>
   <p:clrMapOvr>

</xml_diff>